<commit_message>
revisione template slide 2023
</commit_message>
<xml_diff>
--- a/Azure Day/2023/Slides/TemplateAzureDay2023.pptx
+++ b/Azure Day/2023/Slides/TemplateAzureDay2023.pptx
@@ -11,12 +11,11 @@
   <p:sldIdLst>
     <p:sldId id="256" r:id="rId6"/>
     <p:sldId id="258" r:id="rId7"/>
-    <p:sldId id="257" r:id="rId8"/>
-    <p:sldId id="259" r:id="rId9"/>
-    <p:sldId id="260" r:id="rId10"/>
-    <p:sldId id="261" r:id="rId11"/>
-    <p:sldId id="263" r:id="rId12"/>
-    <p:sldId id="262" r:id="rId13"/>
+    <p:sldId id="259" r:id="rId8"/>
+    <p:sldId id="260" r:id="rId9"/>
+    <p:sldId id="261" r:id="rId10"/>
+    <p:sldId id="263" r:id="rId11"/>
+    <p:sldId id="262" r:id="rId12"/>
   </p:sldIdLst>
   <p:sldSz cx="12192000" cy="6858000"/>
   <p:notesSz cx="6858000" cy="9144000"/>
@@ -14898,26 +14897,62 @@
           <a:chExt cx="0" cy="0"/>
         </a:xfrm>
       </p:grpSpPr>
-      <p:sp>
-        <p:nvSpPr>
-          <p:cNvPr id="2" name="Segnaposto data 1">
-            <a:extLst>
-              <a:ext uri="{FF2B5EF4-FFF2-40B4-BE49-F238E27FC236}">
-                <a16:creationId xmlns:a16="http://schemas.microsoft.com/office/drawing/2014/main" id="{9AA4FEEB-698F-4425-B0B5-04B44DD26685}"/>
-              </a:ext>
-            </a:extLst>
-          </p:cNvPr>
-          <p:cNvSpPr>
-            <a:spLocks noGrp="1"/>
-          </p:cNvSpPr>
-          <p:nvPr>
-            <p:ph type="dt" sz="half" idx="10"/>
-          </p:nvPr>
-        </p:nvSpPr>
+      <p:pic>
+        <p:nvPicPr>
+          <p:cNvPr id="10" name="Picture 9" descr="Yellow and blue symbols">
+            <a:extLst>
+              <a:ext uri="{FF2B5EF4-FFF2-40B4-BE49-F238E27FC236}">
+                <a16:creationId xmlns:a16="http://schemas.microsoft.com/office/drawing/2014/main" id="{F166FFCD-9468-2B31-BCAA-F7AAC91BF12D}"/>
+              </a:ext>
+            </a:extLst>
+          </p:cNvPr>
+          <p:cNvPicPr>
+            <a:picLocks noChangeAspect="1"/>
+          </p:cNvPicPr>
+          <p:nvPr userDrawn="1"/>
+        </p:nvPicPr>
+        <p:blipFill>
+          <a:blip r:embed="rId2">
+            <a:extLst>
+              <a:ext uri="{28A0092B-C50C-407E-A947-70E740481C1C}">
+                <a14:useLocalDpi xmlns:a14="http://schemas.microsoft.com/office/drawing/2010/main" val="0"/>
+              </a:ext>
+            </a:extLst>
+          </a:blip>
+          <a:stretch>
+            <a:fillRect/>
+          </a:stretch>
+        </p:blipFill>
         <p:spPr>
           <a:xfrm>
-            <a:off x="10504714" y="6356350"/>
-            <a:ext cx="1277983" cy="365125"/>
+            <a:off x="2377440" y="0"/>
+            <a:ext cx="9814560" cy="6858000"/>
+          </a:xfrm>
+          <a:prstGeom prst="rect">
+            <a:avLst/>
+          </a:prstGeom>
+        </p:spPr>
+      </p:pic>
+      <p:sp>
+        <p:nvSpPr>
+          <p:cNvPr id="2" name="Segnaposto data 1">
+            <a:extLst>
+              <a:ext uri="{FF2B5EF4-FFF2-40B4-BE49-F238E27FC236}">
+                <a16:creationId xmlns:a16="http://schemas.microsoft.com/office/drawing/2014/main" id="{9AA4FEEB-698F-4425-B0B5-04B44DD26685}"/>
+              </a:ext>
+            </a:extLst>
+          </p:cNvPr>
+          <p:cNvSpPr>
+            <a:spLocks noGrp="1"/>
+          </p:cNvSpPr>
+          <p:nvPr>
+            <p:ph type="dt" sz="half" idx="10"/>
+          </p:nvPr>
+        </p:nvSpPr>
+        <p:spPr>
+          <a:xfrm>
+            <a:off x="9929004" y="6356350"/>
+            <a:ext cx="1853693" cy="365125"/>
           </a:xfrm>
           <a:prstGeom prst="rect">
             <a:avLst/>
@@ -15029,6 +15064,42 @@
       </p:sp>
       <p:pic>
         <p:nvPicPr>
+          <p:cNvPr id="7" name="Immagine 6">
+            <a:extLst>
+              <a:ext uri="{FF2B5EF4-FFF2-40B4-BE49-F238E27FC236}">
+                <a16:creationId xmlns:a16="http://schemas.microsoft.com/office/drawing/2014/main" id="{E06A4069-F726-4503-98B9-94A133FC05FE}"/>
+              </a:ext>
+            </a:extLst>
+          </p:cNvPr>
+          <p:cNvPicPr>
+            <a:picLocks noChangeAspect="1"/>
+          </p:cNvPicPr>
+          <p:nvPr userDrawn="1"/>
+        </p:nvPicPr>
+        <p:blipFill>
+          <a:blip r:embed="rId3">
+            <a:extLst>
+              <a:ext uri="{28A0092B-C50C-407E-A947-70E740481C1C}">
+                <a14:useLocalDpi xmlns:a14="http://schemas.microsoft.com/office/drawing/2010/main" val="0"/>
+              </a:ext>
+            </a:extLst>
+          </a:blip>
+          <a:stretch>
+            <a:fillRect/>
+          </a:stretch>
+        </p:blipFill>
+        <p:spPr>
+          <a:xfrm>
+            <a:off x="10606202" y="5106572"/>
+            <a:ext cx="1075006" cy="1075006"/>
+          </a:xfrm>
+          <a:prstGeom prst="rect">
+            <a:avLst/>
+          </a:prstGeom>
+        </p:spPr>
+      </p:pic>
+      <p:pic>
+        <p:nvPicPr>
           <p:cNvPr id="5" name="Google Shape;77;p15" descr="photo-1434030216411-0b793f4b4173.jpg">
             <a:extLst>
               <a:ext uri="{FF2B5EF4-FFF2-40B4-BE49-F238E27FC236}">
@@ -15040,7 +15111,7 @@
           <p:nvPr userDrawn="1"/>
         </p:nvPicPr>
         <p:blipFill rotWithShape="1">
-          <a:blip r:embed="rId2">
+          <a:blip r:embed="rId4">
             <a:alphaModFix/>
           </a:blip>
           <a:srcRect l="28831" r="30600"/>
@@ -15058,42 +15129,6 @@
           <a:ln>
             <a:noFill/>
           </a:ln>
-        </p:spPr>
-      </p:pic>
-      <p:pic>
-        <p:nvPicPr>
-          <p:cNvPr id="7" name="Immagine 6">
-            <a:extLst>
-              <a:ext uri="{FF2B5EF4-FFF2-40B4-BE49-F238E27FC236}">
-                <a16:creationId xmlns:a16="http://schemas.microsoft.com/office/drawing/2014/main" id="{E06A4069-F726-4503-98B9-94A133FC05FE}"/>
-              </a:ext>
-            </a:extLst>
-          </p:cNvPr>
-          <p:cNvPicPr>
-            <a:picLocks noChangeAspect="1"/>
-          </p:cNvPicPr>
-          <p:nvPr userDrawn="1"/>
-        </p:nvPicPr>
-        <p:blipFill>
-          <a:blip r:embed="rId3">
-            <a:extLst>
-              <a:ext uri="{28A0092B-C50C-407E-A947-70E740481C1C}">
-                <a14:useLocalDpi xmlns:a14="http://schemas.microsoft.com/office/drawing/2010/main" val="0"/>
-              </a:ext>
-            </a:extLst>
-          </a:blip>
-          <a:stretch>
-            <a:fillRect/>
-          </a:stretch>
-        </p:blipFill>
-        <p:spPr>
-          <a:xfrm>
-            <a:off x="10606202" y="5106572"/>
-            <a:ext cx="1075006" cy="1075006"/>
-          </a:xfrm>
-          <a:prstGeom prst="rect">
-            <a:avLst/>
-          </a:prstGeom>
         </p:spPr>
       </p:pic>
     </p:spTree>
@@ -15505,8 +15540,8 @@
         </p:blipFill>
         <p:spPr bwMode="auto">
           <a:xfrm>
-            <a:off x="1903600" y="2277100"/>
-            <a:ext cx="3296320" cy="1648160"/>
+            <a:off x="1243266" y="2041415"/>
+            <a:ext cx="4456742" cy="2228371"/>
           </a:xfrm>
           <a:prstGeom prst="rect">
             <a:avLst/>
@@ -15537,7 +15572,7 @@
           </p:cNvPicPr>
           <p:nvPr userDrawn="1"/>
         </p:nvPicPr>
-        <p:blipFill>
+        <p:blipFill rotWithShape="1">
           <a:blip r:embed="rId4">
             <a:extLst>
               <a:ext uri="{28A0092B-C50C-407E-A947-70E740481C1C}">
@@ -15545,15 +15580,13 @@
               </a:ext>
             </a:extLst>
           </a:blip>
-          <a:srcRect/>
-          <a:stretch>
-            <a:fillRect/>
-          </a:stretch>
+          <a:srcRect l="3102" t="17090" r="5583" b="23192"/>
+          <a:stretch/>
         </p:blipFill>
         <p:spPr bwMode="auto">
           <a:xfrm>
-            <a:off x="5273492" y="4117341"/>
-            <a:ext cx="1745443" cy="872722"/>
+            <a:off x="5425689" y="4337461"/>
+            <a:ext cx="1593851" cy="521172"/>
           </a:xfrm>
           <a:prstGeom prst="rect">
             <a:avLst/>
@@ -15572,10 +15605,10 @@
       </p:pic>
       <p:pic>
         <p:nvPicPr>
-          <p:cNvPr id="20" name="Immagine 19">
-            <a:extLst>
-              <a:ext uri="{FF2B5EF4-FFF2-40B4-BE49-F238E27FC236}">
-                <a16:creationId xmlns:a16="http://schemas.microsoft.com/office/drawing/2014/main" id="{8BE2B814-4AB1-49BF-9E23-73C7B30928CE}"/>
+          <p:cNvPr id="21" name="Immagine 20" descr="Immagine che contiene testo, bigliettodavisita, grafica vettoriale&#10;&#10;Descrizione generata automaticamente">
+            <a:extLst>
+              <a:ext uri="{FF2B5EF4-FFF2-40B4-BE49-F238E27FC236}">
+                <a16:creationId xmlns:a16="http://schemas.microsoft.com/office/drawing/2014/main" id="{C8E6F388-7C62-4230-8DC6-8218AD2A8014}"/>
               </a:ext>
             </a:extLst>
           </p:cNvPr>
@@ -15598,43 +15631,7 @@
         </p:blipFill>
         <p:spPr>
           <a:xfrm>
-            <a:off x="12399531" y="5185981"/>
-            <a:ext cx="1175497" cy="1175497"/>
-          </a:xfrm>
-          <a:prstGeom prst="rect">
-            <a:avLst/>
-          </a:prstGeom>
-        </p:spPr>
-      </p:pic>
-      <p:pic>
-        <p:nvPicPr>
-          <p:cNvPr id="21" name="Immagine 20" descr="Immagine che contiene testo, bigliettodavisita, grafica vettoriale&#10;&#10;Descrizione generata automaticamente">
-            <a:extLst>
-              <a:ext uri="{FF2B5EF4-FFF2-40B4-BE49-F238E27FC236}">
-                <a16:creationId xmlns:a16="http://schemas.microsoft.com/office/drawing/2014/main" id="{C8E6F388-7C62-4230-8DC6-8218AD2A8014}"/>
-              </a:ext>
-            </a:extLst>
-          </p:cNvPr>
-          <p:cNvPicPr>
-            <a:picLocks noChangeAspect="1"/>
-          </p:cNvPicPr>
-          <p:nvPr userDrawn="1"/>
-        </p:nvPicPr>
-        <p:blipFill>
-          <a:blip r:embed="rId6">
-            <a:extLst>
-              <a:ext uri="{28A0092B-C50C-407E-A947-70E740481C1C}">
-                <a14:useLocalDpi xmlns:a14="http://schemas.microsoft.com/office/drawing/2010/main" val="0"/>
-              </a:ext>
-            </a:extLst>
-          </a:blip>
-          <a:stretch>
-            <a:fillRect/>
-          </a:stretch>
-        </p:blipFill>
-        <p:spPr>
-          <a:xfrm>
-            <a:off x="6379722" y="5261621"/>
+            <a:off x="7674439" y="5236857"/>
             <a:ext cx="1049653" cy="1049653"/>
           </a:xfrm>
           <a:prstGeom prst="rect">
@@ -15657,7 +15654,7 @@
           <p:nvPr userDrawn="1"/>
         </p:nvPicPr>
         <p:blipFill>
-          <a:blip r:embed="rId7">
+          <a:blip r:embed="rId6">
             <a:extLst>
               <a:ext uri="{28A0092B-C50C-407E-A947-70E740481C1C}">
                 <a14:useLocalDpi xmlns:a14="http://schemas.microsoft.com/office/drawing/2010/main" val="0"/>
@@ -15670,8 +15667,8 @@
         </p:blipFill>
         <p:spPr>
           <a:xfrm>
-            <a:off x="7770732" y="5401507"/>
-            <a:ext cx="757556" cy="757556"/>
+            <a:off x="289815" y="377563"/>
+            <a:ext cx="1075005" cy="1075005"/>
           </a:xfrm>
           <a:prstGeom prst="rect">
             <a:avLst/>
@@ -15692,23 +15689,21 @@
           </p:cNvPicPr>
           <p:nvPr userDrawn="1"/>
         </p:nvPicPr>
-        <p:blipFill>
-          <a:blip r:embed="rId8">
+        <p:blipFill rotWithShape="1">
+          <a:blip r:embed="rId7">
             <a:extLst>
               <a:ext uri="{28A0092B-C50C-407E-A947-70E740481C1C}">
                 <a14:useLocalDpi xmlns:a14="http://schemas.microsoft.com/office/drawing/2010/main" val="0"/>
               </a:ext>
             </a:extLst>
           </a:blip>
-          <a:srcRect/>
-          <a:stretch>
-            <a:fillRect/>
-          </a:stretch>
+          <a:srcRect l="8549" t="27448" r="7089" b="26358"/>
+          <a:stretch/>
         </p:blipFill>
         <p:spPr bwMode="auto">
           <a:xfrm>
-            <a:off x="9509653" y="4058917"/>
-            <a:ext cx="1979138" cy="989570"/>
+            <a:off x="9191980" y="4352083"/>
+            <a:ext cx="2156504" cy="590424"/>
           </a:xfrm>
           <a:prstGeom prst="rect">
             <a:avLst/>
@@ -15739,23 +15734,21 @@
           </p:cNvPicPr>
           <p:nvPr userDrawn="1"/>
         </p:nvPicPr>
-        <p:blipFill>
-          <a:blip r:embed="rId9">
+        <p:blipFill rotWithShape="1">
+          <a:blip r:embed="rId8">
             <a:extLst>
               <a:ext uri="{28A0092B-C50C-407E-A947-70E740481C1C}">
                 <a14:useLocalDpi xmlns:a14="http://schemas.microsoft.com/office/drawing/2010/main" val="0"/>
               </a:ext>
             </a:extLst>
           </a:blip>
-          <a:srcRect/>
-          <a:stretch>
-            <a:fillRect/>
-          </a:stretch>
+          <a:srcRect l="15960" t="10558" r="17008" b="14934"/>
+          <a:stretch/>
         </p:blipFill>
         <p:spPr bwMode="auto">
           <a:xfrm>
-            <a:off x="7326489" y="4084800"/>
-            <a:ext cx="1875609" cy="937805"/>
+            <a:off x="7574579" y="4352083"/>
+            <a:ext cx="1062362" cy="590424"/>
           </a:xfrm>
           <a:prstGeom prst="rect">
             <a:avLst/>
@@ -15786,22 +15779,21 @@
           </p:cNvPicPr>
           <p:nvPr userDrawn="1"/>
         </p:nvPicPr>
-        <p:blipFill>
-          <a:blip r:embed="rId10">
+        <p:blipFill rotWithShape="1">
+          <a:blip r:embed="rId9">
             <a:extLst>
               <a:ext uri="{28A0092B-C50C-407E-A947-70E740481C1C}">
                 <a14:useLocalDpi xmlns:a14="http://schemas.microsoft.com/office/drawing/2010/main" val="0"/>
               </a:ext>
             </a:extLst>
           </a:blip>
-          <a:stretch>
-            <a:fillRect/>
-          </a:stretch>
+          <a:srcRect l="4715" t="22108" r="6107" b="22318"/>
+          <a:stretch/>
         </p:blipFill>
         <p:spPr>
           <a:xfrm>
-            <a:off x="3090329" y="4084800"/>
-            <a:ext cx="1875609" cy="937805"/>
+            <a:off x="3198017" y="4352083"/>
+            <a:ext cx="1672633" cy="521173"/>
           </a:xfrm>
           <a:prstGeom prst="rect">
             <a:avLst/>
@@ -15823,7 +15815,7 @@
           <p:nvPr userDrawn="1"/>
         </p:nvPicPr>
         <p:blipFill>
-          <a:blip r:embed="rId11">
+          <a:blip r:embed="rId10">
             <a:extLst>
               <a:ext uri="{28A0092B-C50C-407E-A947-70E740481C1C}">
                 <a14:useLocalDpi xmlns:a14="http://schemas.microsoft.com/office/drawing/2010/main" val="0"/>
@@ -15837,7 +15829,7 @@
         </p:blipFill>
         <p:spPr bwMode="auto">
           <a:xfrm>
-            <a:off x="2557956" y="5261621"/>
+            <a:off x="3198017" y="5236857"/>
             <a:ext cx="1875610" cy="937805"/>
           </a:xfrm>
           <a:prstGeom prst="rect">
@@ -15870,7 +15862,7 @@
           <p:nvPr userDrawn="1"/>
         </p:nvPicPr>
         <p:blipFill>
-          <a:blip r:embed="rId12">
+          <a:blip r:embed="rId11">
             <a:extLst>
               <a:ext uri="{28A0092B-C50C-407E-A947-70E740481C1C}">
                 <a14:useLocalDpi xmlns:a14="http://schemas.microsoft.com/office/drawing/2010/main" val="0"/>
@@ -15883,7 +15875,7 @@
         </p:blipFill>
         <p:spPr>
           <a:xfrm>
-            <a:off x="4468840" y="5253800"/>
+            <a:off x="5340767" y="5236858"/>
             <a:ext cx="1875608" cy="937804"/>
           </a:xfrm>
           <a:prstGeom prst="rect">
@@ -15905,23 +15897,21 @@
           </p:cNvPicPr>
           <p:nvPr userDrawn="1"/>
         </p:nvPicPr>
-        <p:blipFill>
-          <a:blip r:embed="rId13">
+        <p:blipFill rotWithShape="1">
+          <a:blip r:embed="rId12">
             <a:extLst>
               <a:ext uri="{28A0092B-C50C-407E-A947-70E740481C1C}">
                 <a14:useLocalDpi xmlns:a14="http://schemas.microsoft.com/office/drawing/2010/main" val="0"/>
               </a:ext>
             </a:extLst>
           </a:blip>
-          <a:srcRect/>
-          <a:stretch>
-            <a:fillRect/>
-          </a:stretch>
+          <a:srcRect t="23566" b="32751"/>
+          <a:stretch/>
         </p:blipFill>
         <p:spPr bwMode="auto">
           <a:xfrm>
-            <a:off x="803637" y="4058918"/>
-            <a:ext cx="1979138" cy="989569"/>
+            <a:off x="663841" y="4352083"/>
+            <a:ext cx="1979138" cy="432274"/>
           </a:xfrm>
           <a:prstGeom prst="rect">
             <a:avLst/>
@@ -15953,7 +15943,7 @@
           <p:nvPr userDrawn="1"/>
         </p:nvPicPr>
         <p:blipFill>
-          <a:blip r:embed="rId14">
+          <a:blip r:embed="rId13">
             <a:extLst>
               <a:ext uri="{28A0092B-C50C-407E-A947-70E740481C1C}">
                 <a14:useLocalDpi xmlns:a14="http://schemas.microsoft.com/office/drawing/2010/main" val="0"/>
@@ -15967,8 +15957,8 @@
         </p:blipFill>
         <p:spPr bwMode="auto">
           <a:xfrm>
-            <a:off x="6213333" y="2333402"/>
-            <a:ext cx="3296320" cy="1648160"/>
+            <a:off x="6096000" y="2041415"/>
+            <a:ext cx="4456744" cy="2228372"/>
           </a:xfrm>
           <a:prstGeom prst="rect">
             <a:avLst/>
@@ -15983,6 +15973,42 @@
               </a14:hiddenFill>
             </a:ext>
           </a:extLst>
+        </p:spPr>
+      </p:pic>
+      <p:pic>
+        <p:nvPicPr>
+          <p:cNvPr id="2" name="Immagine 11">
+            <a:extLst>
+              <a:ext uri="{FF2B5EF4-FFF2-40B4-BE49-F238E27FC236}">
+                <a16:creationId xmlns:a16="http://schemas.microsoft.com/office/drawing/2014/main" id="{65F23012-93BB-B4D4-62AF-9957573BF9F6}"/>
+              </a:ext>
+            </a:extLst>
+          </p:cNvPr>
+          <p:cNvPicPr>
+            <a:picLocks noChangeAspect="1"/>
+          </p:cNvPicPr>
+          <p:nvPr userDrawn="1"/>
+        </p:nvPicPr>
+        <p:blipFill>
+          <a:blip r:embed="rId14">
+            <a:extLst>
+              <a:ext uri="{28A0092B-C50C-407E-A947-70E740481C1C}">
+                <a14:useLocalDpi xmlns:a14="http://schemas.microsoft.com/office/drawing/2010/main" val="0"/>
+              </a:ext>
+            </a:extLst>
+          </a:blip>
+          <a:stretch>
+            <a:fillRect/>
+          </a:stretch>
+        </p:blipFill>
+        <p:spPr>
+          <a:xfrm>
+            <a:off x="10827179" y="377562"/>
+            <a:ext cx="1075006" cy="1075006"/>
+          </a:xfrm>
+          <a:prstGeom prst="rect">
+            <a:avLst/>
+          </a:prstGeom>
         </p:spPr>
       </p:pic>
     </p:spTree>
@@ -19874,7 +19900,12 @@
             <p:ph type="ctrTitle"/>
           </p:nvPr>
         </p:nvSpPr>
-        <p:spPr/>
+        <p:spPr>
+          <a:xfrm>
+            <a:off x="3715367" y="2625167"/>
+            <a:ext cx="7812800" cy="3042388"/>
+          </a:xfrm>
+        </p:spPr>
         <p:txBody>
           <a:bodyPr/>
           <a:lstStyle/>
@@ -19882,6 +19913,209 @@
             <a:r>
               <a:rPr lang="it-IT" dirty="0"/>
               <a:t>Session Title</a:t>
+            </a:r>
+          </a:p>
+        </p:txBody>
+      </p:sp>
+      <p:sp>
+        <p:nvSpPr>
+          <p:cNvPr id="2" name="Titolo 3">
+            <a:extLst>
+              <a:ext uri="{FF2B5EF4-FFF2-40B4-BE49-F238E27FC236}">
+                <a16:creationId xmlns:a16="http://schemas.microsoft.com/office/drawing/2014/main" id="{EE9FFB28-0C5E-7BC5-B50D-B2BFD36B73C2}"/>
+              </a:ext>
+            </a:extLst>
+          </p:cNvPr>
+          <p:cNvSpPr txBox="1">
+            <a:spLocks/>
+          </p:cNvSpPr>
+          <p:nvPr/>
+        </p:nvSpPr>
+        <p:spPr>
+          <a:xfrm>
+            <a:off x="3781502" y="4853796"/>
+            <a:ext cx="7812800" cy="1627517"/>
+          </a:xfrm>
+          <a:prstGeom prst="rect">
+            <a:avLst/>
+          </a:prstGeom>
+        </p:spPr>
+        <p:txBody>
+          <a:bodyPr spcFirstLastPara="1" wrap="square" lIns="91425" tIns="91425" rIns="91425" bIns="91425" anchor="b" anchorCtr="0"/>
+          <a:lstStyle>
+            <a:lvl1pPr lvl="0" algn="r" defTabSz="914400" rtl="0" eaLnBrk="1" latinLnBrk="0" hangingPunct="1">
+              <a:lnSpc>
+                <a:spcPct val="90000"/>
+              </a:lnSpc>
+              <a:spcBef>
+                <a:spcPts val="0"/>
+              </a:spcBef>
+              <a:spcAft>
+                <a:spcPts val="0"/>
+              </a:spcAft>
+              <a:buClr>
+                <a:srgbClr val="FFFFFF"/>
+              </a:buClr>
+              <a:buSzPts val="4800"/>
+              <a:buNone/>
+              <a:defRPr sz="6600" kern="1200">
+                <a:solidFill>
+                  <a:srgbClr val="FFFFFF"/>
+                </a:solidFill>
+                <a:latin typeface="+mj-lt"/>
+                <a:ea typeface="+mj-ea"/>
+                <a:cs typeface="+mj-cs"/>
+              </a:defRPr>
+            </a:lvl1pPr>
+            <a:lvl2pPr lvl="1" algn="ctr">
+              <a:spcBef>
+                <a:spcPts val="0"/>
+              </a:spcBef>
+              <a:spcAft>
+                <a:spcPts val="0"/>
+              </a:spcAft>
+              <a:buClr>
+                <a:srgbClr val="FFFFFF"/>
+              </a:buClr>
+              <a:buSzPts val="4800"/>
+              <a:buNone/>
+              <a:defRPr sz="6400">
+                <a:solidFill>
+                  <a:srgbClr val="FFFFFF"/>
+                </a:solidFill>
+              </a:defRPr>
+            </a:lvl2pPr>
+            <a:lvl3pPr lvl="2" algn="ctr">
+              <a:spcBef>
+                <a:spcPts val="0"/>
+              </a:spcBef>
+              <a:spcAft>
+                <a:spcPts val="0"/>
+              </a:spcAft>
+              <a:buClr>
+                <a:srgbClr val="FFFFFF"/>
+              </a:buClr>
+              <a:buSzPts val="4800"/>
+              <a:buNone/>
+              <a:defRPr sz="6400">
+                <a:solidFill>
+                  <a:srgbClr val="FFFFFF"/>
+                </a:solidFill>
+              </a:defRPr>
+            </a:lvl3pPr>
+            <a:lvl4pPr lvl="3" algn="ctr">
+              <a:spcBef>
+                <a:spcPts val="0"/>
+              </a:spcBef>
+              <a:spcAft>
+                <a:spcPts val="0"/>
+              </a:spcAft>
+              <a:buClr>
+                <a:srgbClr val="FFFFFF"/>
+              </a:buClr>
+              <a:buSzPts val="4800"/>
+              <a:buNone/>
+              <a:defRPr sz="6400">
+                <a:solidFill>
+                  <a:srgbClr val="FFFFFF"/>
+                </a:solidFill>
+              </a:defRPr>
+            </a:lvl4pPr>
+            <a:lvl5pPr lvl="4" algn="ctr">
+              <a:spcBef>
+                <a:spcPts val="0"/>
+              </a:spcBef>
+              <a:spcAft>
+                <a:spcPts val="0"/>
+              </a:spcAft>
+              <a:buClr>
+                <a:srgbClr val="FFFFFF"/>
+              </a:buClr>
+              <a:buSzPts val="4800"/>
+              <a:buNone/>
+              <a:defRPr sz="6400">
+                <a:solidFill>
+                  <a:srgbClr val="FFFFFF"/>
+                </a:solidFill>
+              </a:defRPr>
+            </a:lvl5pPr>
+            <a:lvl6pPr lvl="5" algn="ctr">
+              <a:spcBef>
+                <a:spcPts val="0"/>
+              </a:spcBef>
+              <a:spcAft>
+                <a:spcPts val="0"/>
+              </a:spcAft>
+              <a:buClr>
+                <a:srgbClr val="FFFFFF"/>
+              </a:buClr>
+              <a:buSzPts val="4800"/>
+              <a:buNone/>
+              <a:defRPr sz="6400">
+                <a:solidFill>
+                  <a:srgbClr val="FFFFFF"/>
+                </a:solidFill>
+              </a:defRPr>
+            </a:lvl6pPr>
+            <a:lvl7pPr lvl="6" algn="ctr">
+              <a:spcBef>
+                <a:spcPts val="0"/>
+              </a:spcBef>
+              <a:spcAft>
+                <a:spcPts val="0"/>
+              </a:spcAft>
+              <a:buClr>
+                <a:srgbClr val="FFFFFF"/>
+              </a:buClr>
+              <a:buSzPts val="4800"/>
+              <a:buNone/>
+              <a:defRPr sz="6400">
+                <a:solidFill>
+                  <a:srgbClr val="FFFFFF"/>
+                </a:solidFill>
+              </a:defRPr>
+            </a:lvl7pPr>
+            <a:lvl8pPr lvl="7" algn="ctr">
+              <a:spcBef>
+                <a:spcPts val="0"/>
+              </a:spcBef>
+              <a:spcAft>
+                <a:spcPts val="0"/>
+              </a:spcAft>
+              <a:buClr>
+                <a:srgbClr val="FFFFFF"/>
+              </a:buClr>
+              <a:buSzPts val="4800"/>
+              <a:buNone/>
+              <a:defRPr sz="6400">
+                <a:solidFill>
+                  <a:srgbClr val="FFFFFF"/>
+                </a:solidFill>
+              </a:defRPr>
+            </a:lvl8pPr>
+            <a:lvl9pPr lvl="8" algn="ctr">
+              <a:spcBef>
+                <a:spcPts val="0"/>
+              </a:spcBef>
+              <a:spcAft>
+                <a:spcPts val="0"/>
+              </a:spcAft>
+              <a:buClr>
+                <a:srgbClr val="FFFFFF"/>
+              </a:buClr>
+              <a:buSzPts val="4800"/>
+              <a:buNone/>
+              <a:defRPr sz="6400">
+                <a:solidFill>
+                  <a:srgbClr val="FFFFFF"/>
+                </a:solidFill>
+              </a:defRPr>
+            </a:lvl9pPr>
+          </a:lstStyle>
+          <a:p>
+            <a:r>
+              <a:rPr lang="it-IT" sz="4000" dirty="0"/>
+              <a:t>Speaker name @ company</a:t>
             </a:r>
           </a:p>
         </p:txBody>
@@ -19948,10 +20182,35 @@
       </p:grpSpPr>
       <p:sp>
         <p:nvSpPr>
-          <p:cNvPr id="2" name="Titolo 1">
-            <a:extLst>
-              <a:ext uri="{FF2B5EF4-FFF2-40B4-BE49-F238E27FC236}">
-                <a16:creationId xmlns:a16="http://schemas.microsoft.com/office/drawing/2014/main" id="{82954598-C7EE-48F7-8E78-20DDDB3A7401}"/>
+          <p:cNvPr id="6" name="Segnaposto contenuto 5">
+            <a:extLst>
+              <a:ext uri="{FF2B5EF4-FFF2-40B4-BE49-F238E27FC236}">
+                <a16:creationId xmlns:a16="http://schemas.microsoft.com/office/drawing/2014/main" id="{2473D9E2-DEFE-412D-9A18-924B8EECBE47}"/>
+              </a:ext>
+            </a:extLst>
+          </p:cNvPr>
+          <p:cNvSpPr>
+            <a:spLocks noGrp="1"/>
+          </p:cNvSpPr>
+          <p:nvPr>
+            <p:ph idx="1"/>
+          </p:nvPr>
+        </p:nvSpPr>
+        <p:spPr/>
+        <p:txBody>
+          <a:bodyPr/>
+          <a:lstStyle/>
+          <a:p>
+            <a:endParaRPr lang="it-IT" dirty="0"/>
+          </a:p>
+        </p:txBody>
+      </p:sp>
+      <p:sp>
+        <p:nvSpPr>
+          <p:cNvPr id="5" name="Titolo 4">
+            <a:extLst>
+              <a:ext uri="{FF2B5EF4-FFF2-40B4-BE49-F238E27FC236}">
+                <a16:creationId xmlns:a16="http://schemas.microsoft.com/office/drawing/2014/main" id="{8CAE0EFC-B7FF-4C7D-BF02-BDDAEA8577D3}"/>
               </a:ext>
             </a:extLst>
           </p:cNvPr>
@@ -19969,36 +20228,105 @@
           </a:bodyPr>
           <a:lstStyle/>
           <a:p>
+            <a:endParaRPr lang="it-IT"/>
+          </a:p>
+        </p:txBody>
+      </p:sp>
+      <p:sp>
+        <p:nvSpPr>
+          <p:cNvPr id="2" name="Rectangle 1">
+            <a:extLst>
+              <a:ext uri="{FF2B5EF4-FFF2-40B4-BE49-F238E27FC236}">
+                <a16:creationId xmlns:a16="http://schemas.microsoft.com/office/drawing/2014/main" id="{FC8F346C-88C7-529A-F799-950BB4C30D4E}"/>
+              </a:ext>
+            </a:extLst>
+          </p:cNvPr>
+          <p:cNvSpPr/>
+          <p:nvPr/>
+        </p:nvSpPr>
+        <p:spPr>
+          <a:xfrm>
+            <a:off x="8126083" y="244481"/>
+            <a:ext cx="3795623" cy="2139351"/>
+          </a:xfrm>
+          <a:prstGeom prst="rect">
+            <a:avLst/>
+          </a:prstGeom>
+        </p:spPr>
+        <p:style>
+          <a:lnRef idx="2">
+            <a:schemeClr val="accent1">
+              <a:shade val="50000"/>
+            </a:schemeClr>
+          </a:lnRef>
+          <a:fillRef idx="1">
+            <a:schemeClr val="accent1"/>
+          </a:fillRef>
+          <a:effectRef idx="0">
+            <a:schemeClr val="accent1"/>
+          </a:effectRef>
+          <a:fontRef idx="minor">
+            <a:schemeClr val="lt1"/>
+          </a:fontRef>
+        </p:style>
+        <p:txBody>
+          <a:bodyPr rtlCol="0" anchor="ctr"/>
+          <a:lstStyle/>
+          <a:p>
             <a:pPr algn="ctr"/>
             <a:r>
-              <a:rPr lang="it-IT" dirty="0"/>
-              <a:t>AGENDA</a:t>
-            </a:r>
-          </a:p>
-        </p:txBody>
-      </p:sp>
-      <p:sp>
-        <p:nvSpPr>
-          <p:cNvPr id="3" name="Segnaposto contenuto 2">
-            <a:extLst>
-              <a:ext uri="{FF2B5EF4-FFF2-40B4-BE49-F238E27FC236}">
-                <a16:creationId xmlns:a16="http://schemas.microsoft.com/office/drawing/2014/main" id="{448EF4F0-1B6D-4CB6-92BF-7CD8104A7A88}"/>
-              </a:ext>
-            </a:extLst>
-          </p:cNvPr>
-          <p:cNvSpPr>
-            <a:spLocks noGrp="1"/>
-          </p:cNvSpPr>
-          <p:nvPr>
-            <p:ph idx="1"/>
-          </p:nvPr>
-        </p:nvSpPr>
-        <p:spPr/>
+              <a:rPr lang="it-IT" dirty="0" err="1"/>
+              <a:t>Please</a:t>
+            </a:r>
+            <a:r>
+              <a:rPr lang="it-IT" dirty="0"/>
+              <a:t> </a:t>
+            </a:r>
+            <a:r>
+              <a:rPr lang="it-IT" dirty="0" err="1"/>
+              <a:t>avoid</a:t>
+            </a:r>
+            <a:r>
+              <a:rPr lang="it-IT" dirty="0"/>
+              <a:t> </a:t>
+            </a:r>
+            <a:r>
+              <a:rPr lang="it-IT" dirty="0" err="1"/>
+              <a:t>contents</a:t>
+            </a:r>
+            <a:r>
+              <a:rPr lang="it-IT" dirty="0"/>
+              <a:t> in </a:t>
+            </a:r>
+            <a:r>
+              <a:rPr lang="it-IT" dirty="0" err="1"/>
+              <a:t>this</a:t>
+            </a:r>
+            <a:r>
+              <a:rPr lang="it-IT" dirty="0"/>
+              <a:t> area</a:t>
+            </a:r>
+          </a:p>
+          <a:p>
+            <a:pPr algn="ctr"/>
+            <a:r>
+              <a:rPr lang="it-IT" dirty="0"/>
+              <a:t>&amp;</a:t>
+            </a:r>
+            <a:br>
+              <a:rPr lang="it-IT" dirty="0"/>
+            </a:br>
+            <a:r>
+              <a:rPr lang="it-IT" dirty="0"/>
+              <a:t>REMOVE THIS PLACEHOLDER</a:t>
+            </a:r>
+          </a:p>
+        </p:txBody>
       </p:sp>
     </p:spTree>
     <p:extLst>
       <p:ext uri="{BB962C8B-B14F-4D97-AF65-F5344CB8AC3E}">
-        <p14:creationId xmlns:p14="http://schemas.microsoft.com/office/powerpoint/2010/main" val="1647802638"/>
+        <p14:creationId xmlns:p14="http://schemas.microsoft.com/office/powerpoint/2010/main" val="909185628"/>
       </p:ext>
     </p:extLst>
   </p:cSld>
@@ -20027,35 +20355,10 @@
       </p:grpSpPr>
       <p:sp>
         <p:nvSpPr>
-          <p:cNvPr id="6" name="Segnaposto contenuto 5">
-            <a:extLst>
-              <a:ext uri="{FF2B5EF4-FFF2-40B4-BE49-F238E27FC236}">
-                <a16:creationId xmlns:a16="http://schemas.microsoft.com/office/drawing/2014/main" id="{2473D9E2-DEFE-412D-9A18-924B8EECBE47}"/>
-              </a:ext>
-            </a:extLst>
-          </p:cNvPr>
-          <p:cNvSpPr>
-            <a:spLocks noGrp="1"/>
-          </p:cNvSpPr>
-          <p:nvPr>
-            <p:ph idx="1"/>
-          </p:nvPr>
-        </p:nvSpPr>
-        <p:spPr/>
-        <p:txBody>
-          <a:bodyPr/>
-          <a:lstStyle/>
-          <a:p>
-            <a:endParaRPr lang="it-IT"/>
-          </a:p>
-        </p:txBody>
-      </p:sp>
-      <p:sp>
-        <p:nvSpPr>
-          <p:cNvPr id="5" name="Titolo 4">
-            <a:extLst>
-              <a:ext uri="{FF2B5EF4-FFF2-40B4-BE49-F238E27FC236}">
-                <a16:creationId xmlns:a16="http://schemas.microsoft.com/office/drawing/2014/main" id="{8CAE0EFC-B7FF-4C7D-BF02-BDDAEA8577D3}"/>
+          <p:cNvPr id="2" name="Titolo 1">
+            <a:extLst>
+              <a:ext uri="{FF2B5EF4-FFF2-40B4-BE49-F238E27FC236}">
+                <a16:creationId xmlns:a16="http://schemas.microsoft.com/office/drawing/2014/main" id="{E930828C-9A30-4F4F-9B1D-41435CCCA054}"/>
               </a:ext>
             </a:extLst>
           </p:cNvPr>
@@ -20080,7 +20383,7 @@
     </p:spTree>
     <p:extLst>
       <p:ext uri="{BB962C8B-B14F-4D97-AF65-F5344CB8AC3E}">
-        <p14:creationId xmlns:p14="http://schemas.microsoft.com/office/powerpoint/2010/main" val="909185628"/>
+        <p14:creationId xmlns:p14="http://schemas.microsoft.com/office/powerpoint/2010/main" val="3417245344"/>
       </p:ext>
     </p:extLst>
   </p:cSld>
@@ -20112,7 +20415,7 @@
           <p:cNvPr id="2" name="Titolo 1">
             <a:extLst>
               <a:ext uri="{FF2B5EF4-FFF2-40B4-BE49-F238E27FC236}">
-                <a16:creationId xmlns:a16="http://schemas.microsoft.com/office/drawing/2014/main" id="{E930828C-9A30-4F4F-9B1D-41435CCCA054}"/>
+                <a16:creationId xmlns:a16="http://schemas.microsoft.com/office/drawing/2014/main" id="{0E689928-B287-4F6F-9288-1DE7ADE2F318}"/>
               </a:ext>
             </a:extLst>
           </p:cNvPr>
@@ -20130,14 +20433,14 @@
           </a:bodyPr>
           <a:lstStyle/>
           <a:p>
-            <a:endParaRPr lang="it-IT"/>
+            <a:endParaRPr lang="it-IT" dirty="0"/>
           </a:p>
         </p:txBody>
       </p:sp>
     </p:spTree>
     <p:extLst>
       <p:ext uri="{BB962C8B-B14F-4D97-AF65-F5344CB8AC3E}">
-        <p14:creationId xmlns:p14="http://schemas.microsoft.com/office/powerpoint/2010/main" val="3417245344"/>
+        <p14:creationId xmlns:p14="http://schemas.microsoft.com/office/powerpoint/2010/main" val="3575452940"/>
       </p:ext>
     </p:extLst>
   </p:cSld>
@@ -20166,63 +20469,6 @@
       </p:grpSpPr>
       <p:sp>
         <p:nvSpPr>
-          <p:cNvPr id="2" name="Titolo 1">
-            <a:extLst>
-              <a:ext uri="{FF2B5EF4-FFF2-40B4-BE49-F238E27FC236}">
-                <a16:creationId xmlns:a16="http://schemas.microsoft.com/office/drawing/2014/main" id="{0E689928-B287-4F6F-9288-1DE7ADE2F318}"/>
-              </a:ext>
-            </a:extLst>
-          </p:cNvPr>
-          <p:cNvSpPr>
-            <a:spLocks noGrp="1"/>
-          </p:cNvSpPr>
-          <p:nvPr>
-            <p:ph type="title"/>
-          </p:nvPr>
-        </p:nvSpPr>
-        <p:spPr/>
-        <p:txBody>
-          <a:bodyPr>
-            <a:normAutofit fontScale="90000"/>
-          </a:bodyPr>
-          <a:lstStyle/>
-          <a:p>
-            <a:endParaRPr lang="it-IT"/>
-          </a:p>
-        </p:txBody>
-      </p:sp>
-    </p:spTree>
-    <p:extLst>
-      <p:ext uri="{BB962C8B-B14F-4D97-AF65-F5344CB8AC3E}">
-        <p14:creationId xmlns:p14="http://schemas.microsoft.com/office/powerpoint/2010/main" val="3575452940"/>
-      </p:ext>
-    </p:extLst>
-  </p:cSld>
-  <p:clrMapOvr>
-    <a:masterClrMapping/>
-  </p:clrMapOvr>
-</p:sld>
-</file>
-
-<file path=ppt/slides/slide7.xml><?xml version="1.0" encoding="utf-8"?>
-<p:sld xmlns:a="http://schemas.openxmlformats.org/drawingml/2006/main" xmlns:r="http://schemas.openxmlformats.org/officeDocument/2006/relationships" xmlns:p="http://schemas.openxmlformats.org/presentationml/2006/main">
-  <p:cSld>
-    <p:spTree>
-      <p:nvGrpSpPr>
-        <p:cNvPr id="1" name=""/>
-        <p:cNvGrpSpPr/>
-        <p:nvPr/>
-      </p:nvGrpSpPr>
-      <p:grpSpPr>
-        <a:xfrm>
-          <a:off x="0" y="0"/>
-          <a:ext cx="0" cy="0"/>
-          <a:chOff x="0" y="0"/>
-          <a:chExt cx="0" cy="0"/>
-        </a:xfrm>
-      </p:grpSpPr>
-      <p:sp>
-        <p:nvSpPr>
           <p:cNvPr id="6" name="Segnaposto contenuto 5">
             <a:extLst>
               <a:ext uri="{FF2B5EF4-FFF2-40B4-BE49-F238E27FC236}">
@@ -20302,7 +20548,7 @@
 </p:sld>
 </file>
 
-<file path=ppt/slides/slide8.xml><?xml version="1.0" encoding="utf-8"?>
+<file path=ppt/slides/slide7.xml><?xml version="1.0" encoding="utf-8"?>
 <p:sld xmlns:a="http://schemas.openxmlformats.org/drawingml/2006/main" xmlns:r="http://schemas.openxmlformats.org/officeDocument/2006/relationships" xmlns:p="http://schemas.openxmlformats.org/presentationml/2006/main">
   <p:cSld>
     <p:spTree>

</xml_diff>